<commit_message>
Dodanie ramki i layoutu do prezentacji.
</commit_message>
<xml_diff>
--- a/Prezentacja/Prezentacja.pptx
+++ b/Prezentacja/Prezentacja.pptx
@@ -15,8 +15,9 @@
     <p:sldId id="267" r:id="rId9"/>
     <p:sldId id="261" r:id="rId10"/>
     <p:sldId id="262" r:id="rId11"/>
-    <p:sldId id="263" r:id="rId12"/>
-    <p:sldId id="264" r:id="rId13"/>
+    <p:sldId id="268" r:id="rId12"/>
+    <p:sldId id="263" r:id="rId13"/>
+    <p:sldId id="264" r:id="rId14"/>
   </p:sldIdLst>
   <p:sldSz cx="9144000" cy="6858000" type="screen4x3"/>
   <p:notesSz cx="6858000" cy="9144000"/>
@@ -117,7 +118,7 @@
   </p:defaultTextStyle>
   <p:extLst>
     <p:ext uri="{EFAFB233-063F-42B5-8137-9DF3F51BA10A}">
-      <p15:sldGuideLst xmlns:p15="http://schemas.microsoft.com/office/powerpoint/2012/main"/>
+      <p15:sldGuideLst xmlns:p15="http://schemas.microsoft.com/office/powerpoint/2012/main" xmlns=""/>
     </p:ext>
   </p:extLst>
 </p:presentation>
@@ -1266,12 +1267,12 @@
         </a:fontRef>
       </dsp:style>
       <dsp:txBody>
-        <a:bodyPr spcFirstLastPara="0" vert="horz" wrap="square" lIns="64770" tIns="64770" rIns="64770" bIns="64770" numCol="1" spcCol="1270" anchor="ctr" anchorCtr="0">
+        <a:bodyPr spcFirstLastPara="0" vert="horz" wrap="square" lIns="83820" tIns="83820" rIns="83820" bIns="83820" numCol="1" spcCol="1270" anchor="ctr" anchorCtr="0">
           <a:noAutofit/>
         </a:bodyPr>
         <a:lstStyle/>
         <a:p>
-          <a:pPr lvl="0" algn="l" defTabSz="755650">
+          <a:pPr lvl="0" algn="l" defTabSz="977900">
             <a:lnSpc>
               <a:spcPct val="90000"/>
             </a:lnSpc>
@@ -1283,10 +1284,10 @@
             </a:spcAft>
           </a:pPr>
           <a:r>
-            <a:rPr lang="pl-PL" sz="1700" kern="1200" dirty="0" smtClean="0"/>
+            <a:rPr lang="pl-PL" sz="2200" kern="1200" dirty="0" smtClean="0"/>
             <a:t>Sprawdzenie natężenia ruchu na odpowiednich pasach ruchu</a:t>
           </a:r>
-          <a:endParaRPr lang="pl-PL" sz="1700" kern="1200" dirty="0"/>
+          <a:endParaRPr lang="pl-PL" sz="2200" kern="1200" dirty="0"/>
         </a:p>
       </dsp:txBody>
       <dsp:txXfrm>
@@ -1335,12 +1336,12 @@
         </a:fontRef>
       </dsp:style>
       <dsp:txBody>
-        <a:bodyPr spcFirstLastPara="0" vert="horz" wrap="square" lIns="64770" tIns="64770" rIns="64770" bIns="64770" numCol="1" spcCol="1270" anchor="ctr" anchorCtr="0">
+        <a:bodyPr spcFirstLastPara="0" vert="horz" wrap="square" lIns="83820" tIns="83820" rIns="83820" bIns="83820" numCol="1" spcCol="1270" anchor="ctr" anchorCtr="0">
           <a:noAutofit/>
         </a:bodyPr>
         <a:lstStyle/>
         <a:p>
-          <a:pPr lvl="0" algn="l" defTabSz="755650">
+          <a:pPr lvl="0" algn="l" defTabSz="977900">
             <a:lnSpc>
               <a:spcPct val="90000"/>
             </a:lnSpc>
@@ -1352,10 +1353,10 @@
             </a:spcAft>
           </a:pPr>
           <a:r>
-            <a:rPr lang="pl-PL" sz="1700" kern="1200" dirty="0" smtClean="0"/>
+            <a:rPr lang="pl-PL" sz="2200" kern="1200" dirty="0" smtClean="0"/>
             <a:t>Sprawdzanie stanów przycisków na przejściach dla pieszych</a:t>
           </a:r>
-          <a:endParaRPr lang="pl-PL" sz="1700" kern="1200" dirty="0"/>
+          <a:endParaRPr lang="pl-PL" sz="2200" kern="1200" dirty="0"/>
         </a:p>
       </dsp:txBody>
       <dsp:txXfrm>
@@ -1404,12 +1405,12 @@
         </a:fontRef>
       </dsp:style>
       <dsp:txBody>
-        <a:bodyPr spcFirstLastPara="0" vert="horz" wrap="square" lIns="64770" tIns="64770" rIns="64770" bIns="64770" numCol="1" spcCol="1270" anchor="ctr" anchorCtr="0">
+        <a:bodyPr spcFirstLastPara="0" vert="horz" wrap="square" lIns="83820" tIns="83820" rIns="83820" bIns="83820" numCol="1" spcCol="1270" anchor="ctr" anchorCtr="0">
           <a:noAutofit/>
         </a:bodyPr>
         <a:lstStyle/>
         <a:p>
-          <a:pPr lvl="0" algn="l" defTabSz="755650">
+          <a:pPr lvl="0" algn="l" defTabSz="977900">
             <a:lnSpc>
               <a:spcPct val="90000"/>
             </a:lnSpc>
@@ -1421,10 +1422,10 @@
             </a:spcAft>
           </a:pPr>
           <a:r>
-            <a:rPr lang="pl-PL" sz="1700" kern="1200" dirty="0" smtClean="0"/>
+            <a:rPr lang="pl-PL" sz="2200" kern="1200" dirty="0" smtClean="0"/>
             <a:t>Ustawienie odpowiedniego czasu trwania kolejnego cyklu lub nakazanie pominięcia go</a:t>
           </a:r>
-          <a:endParaRPr lang="pl-PL" sz="1700" kern="1200" dirty="0"/>
+          <a:endParaRPr lang="pl-PL" sz="2200" kern="1200" dirty="0"/>
         </a:p>
       </dsp:txBody>
       <dsp:txXfrm>
@@ -1486,12 +1487,12 @@
         <a:fontRef idx="minor"/>
       </dsp:style>
       <dsp:txBody>
-        <a:bodyPr spcFirstLastPara="0" vert="horz" wrap="square" lIns="22860" tIns="22860" rIns="22860" bIns="22860" numCol="1" spcCol="1270" anchor="ctr" anchorCtr="0">
+        <a:bodyPr spcFirstLastPara="0" vert="horz" wrap="square" lIns="33020" tIns="33020" rIns="33020" bIns="33020" numCol="1" spcCol="1270" anchor="ctr" anchorCtr="0">
           <a:noAutofit/>
         </a:bodyPr>
         <a:lstStyle/>
         <a:p>
-          <a:pPr lvl="0" algn="ctr" defTabSz="800100">
+          <a:pPr lvl="0" algn="ctr" defTabSz="1155700">
             <a:lnSpc>
               <a:spcPct val="90000"/>
             </a:lnSpc>
@@ -1502,7 +1503,7 @@
               <a:spcPct val="35000"/>
             </a:spcAft>
           </a:pPr>
-          <a:endParaRPr lang="pl-PL" sz="1800" kern="1200"/>
+          <a:endParaRPr lang="pl-PL" sz="2600" kern="1200"/>
         </a:p>
       </dsp:txBody>
       <dsp:txXfrm>
@@ -1564,12 +1565,12 @@
         <a:fontRef idx="minor"/>
       </dsp:style>
       <dsp:txBody>
-        <a:bodyPr spcFirstLastPara="0" vert="horz" wrap="square" lIns="22860" tIns="22860" rIns="22860" bIns="22860" numCol="1" spcCol="1270" anchor="ctr" anchorCtr="0">
+        <a:bodyPr spcFirstLastPara="0" vert="horz" wrap="square" lIns="33020" tIns="33020" rIns="33020" bIns="33020" numCol="1" spcCol="1270" anchor="ctr" anchorCtr="0">
           <a:noAutofit/>
         </a:bodyPr>
         <a:lstStyle/>
         <a:p>
-          <a:pPr lvl="0" algn="ctr" defTabSz="800100">
+          <a:pPr lvl="0" algn="ctr" defTabSz="1155700">
             <a:lnSpc>
               <a:spcPct val="90000"/>
             </a:lnSpc>
@@ -1580,7 +1581,7 @@
               <a:spcPct val="35000"/>
             </a:spcAft>
           </a:pPr>
-          <a:endParaRPr lang="pl-PL" sz="1800" kern="1200"/>
+          <a:endParaRPr lang="pl-PL" sz="2600" kern="1200"/>
         </a:p>
       </dsp:txBody>
       <dsp:txXfrm>
@@ -3908,8 +3909,8 @@
           </a:prstGeom>
           <a:noFill/>
           <a:extLst>
-            <a:ext uri="{909E8E84-426E-40dd-AFC4-6F175D3DCCD1}">
-              <a14:hiddenFill xmlns="" xmlns:a14="http://schemas.microsoft.com/office/drawing/2010/main">
+            <a:ext uri="{909E8E84-426E-40DD-AFC4-6F175D3DCCD1}">
+              <a14:hiddenFill xmlns:a14="http://schemas.microsoft.com/office/drawing/2010/main">
                 <a:solidFill>
                   <a:srgbClr val="FFFFFF"/>
                 </a:solidFill>
@@ -3968,8 +3969,8 @@
               <a:noFill/>
             </a:ln>
             <a:extLst>
-              <a:ext uri="{91240B29-F687-4f45-9708-019B960494DF}">
-                <a14:hiddenLine xmlns="" xmlns:a14="http://schemas.microsoft.com/office/drawing/2010/main" w="9525">
+              <a:ext uri="{91240B29-F687-4F45-9708-019B960494DF}">
+                <a14:hiddenLine xmlns:a14="http://schemas.microsoft.com/office/drawing/2010/main" w="9525">
                   <a:solidFill>
                     <a:srgbClr val="000000"/>
                   </a:solidFill>
@@ -4058,8 +4059,8 @@
               <a:noFill/>
             </a:ln>
             <a:extLst>
-              <a:ext uri="{91240B29-F687-4f45-9708-019B960494DF}">
-                <a14:hiddenLine xmlns="" xmlns:a14="http://schemas.microsoft.com/office/drawing/2010/main" w="9525">
+              <a:ext uri="{91240B29-F687-4F45-9708-019B960494DF}">
+                <a14:hiddenLine xmlns:a14="http://schemas.microsoft.com/office/drawing/2010/main" w="9525">
                   <a:solidFill>
                     <a:srgbClr val="000000"/>
                   </a:solidFill>
@@ -4148,8 +4149,8 @@
               <a:noFill/>
             </a:ln>
             <a:extLst>
-              <a:ext uri="{91240B29-F687-4f45-9708-019B960494DF}">
-                <a14:hiddenLine xmlns="" xmlns:a14="http://schemas.microsoft.com/office/drawing/2010/main" w="9525">
+              <a:ext uri="{91240B29-F687-4F45-9708-019B960494DF}">
+                <a14:hiddenLine xmlns:a14="http://schemas.microsoft.com/office/drawing/2010/main" w="9525">
                   <a:solidFill>
                     <a:srgbClr val="000000"/>
                   </a:solidFill>
@@ -4182,8 +4183,8 @@
               <a:noFill/>
             </a:ln>
             <a:extLst>
-              <a:ext uri="{91240B29-F687-4f45-9708-019B960494DF}">
-                <a14:hiddenLine xmlns="" xmlns:a14="http://schemas.microsoft.com/office/drawing/2010/main" w="9525">
+              <a:ext uri="{91240B29-F687-4F45-9708-019B960494DF}">
+                <a14:hiddenLine xmlns:a14="http://schemas.microsoft.com/office/drawing/2010/main" w="9525">
                   <a:solidFill>
                     <a:srgbClr val="000000"/>
                   </a:solidFill>
@@ -4272,8 +4273,8 @@
               <a:noFill/>
             </a:ln>
             <a:extLst>
-              <a:ext uri="{91240B29-F687-4f45-9708-019B960494DF}">
-                <a14:hiddenLine xmlns="" xmlns:a14="http://schemas.microsoft.com/office/drawing/2010/main" w="9525">
+              <a:ext uri="{91240B29-F687-4F45-9708-019B960494DF}">
+                <a14:hiddenLine xmlns:a14="http://schemas.microsoft.com/office/drawing/2010/main" w="9525">
                   <a:solidFill>
                     <a:srgbClr val="000000"/>
                   </a:solidFill>
@@ -4334,8 +4335,8 @@
               <a:noFill/>
             </a:ln>
             <a:extLst>
-              <a:ext uri="{91240B29-F687-4f45-9708-019B960494DF}">
-                <a14:hiddenLine xmlns="" xmlns:a14="http://schemas.microsoft.com/office/drawing/2010/main" w="9525">
+              <a:ext uri="{91240B29-F687-4F45-9708-019B960494DF}">
+                <a14:hiddenLine xmlns:a14="http://schemas.microsoft.com/office/drawing/2010/main" w="9525">
                   <a:solidFill>
                     <a:srgbClr val="000000"/>
                   </a:solidFill>
@@ -4396,8 +4397,8 @@
               <a:noFill/>
             </a:ln>
             <a:extLst>
-              <a:ext uri="{91240B29-F687-4f45-9708-019B960494DF}">
-                <a14:hiddenLine xmlns="" xmlns:a14="http://schemas.microsoft.com/office/drawing/2010/main" w="9525">
+              <a:ext uri="{91240B29-F687-4F45-9708-019B960494DF}">
+                <a14:hiddenLine xmlns:a14="http://schemas.microsoft.com/office/drawing/2010/main" w="9525">
                   <a:solidFill>
                     <a:srgbClr val="000000"/>
                   </a:solidFill>
@@ -4486,8 +4487,8 @@
               <a:noFill/>
             </a:ln>
             <a:extLst>
-              <a:ext uri="{91240B29-F687-4f45-9708-019B960494DF}">
-                <a14:hiddenLine xmlns="" xmlns:a14="http://schemas.microsoft.com/office/drawing/2010/main" w="9525">
+              <a:ext uri="{91240B29-F687-4F45-9708-019B960494DF}">
+                <a14:hiddenLine xmlns:a14="http://schemas.microsoft.com/office/drawing/2010/main" w="9525">
                   <a:solidFill>
                     <a:srgbClr val="000000"/>
                   </a:solidFill>
@@ -4548,8 +4549,8 @@
               <a:noFill/>
             </a:ln>
             <a:extLst>
-              <a:ext uri="{91240B29-F687-4f45-9708-019B960494DF}">
-                <a14:hiddenLine xmlns="" xmlns:a14="http://schemas.microsoft.com/office/drawing/2010/main" w="9525">
+              <a:ext uri="{91240B29-F687-4F45-9708-019B960494DF}">
+                <a14:hiddenLine xmlns:a14="http://schemas.microsoft.com/office/drawing/2010/main" w="9525">
                   <a:solidFill>
                     <a:srgbClr val="000000"/>
                   </a:solidFill>
@@ -4610,8 +4611,8 @@
               <a:noFill/>
             </a:ln>
             <a:extLst>
-              <a:ext uri="{91240B29-F687-4f45-9708-019B960494DF}">
-                <a14:hiddenLine xmlns="" xmlns:a14="http://schemas.microsoft.com/office/drawing/2010/main" w="9525">
+              <a:ext uri="{91240B29-F687-4F45-9708-019B960494DF}">
+                <a14:hiddenLine xmlns:a14="http://schemas.microsoft.com/office/drawing/2010/main" w="9525">
                   <a:solidFill>
                     <a:srgbClr val="000000"/>
                   </a:solidFill>
@@ -4700,8 +4701,8 @@
               <a:noFill/>
             </a:ln>
             <a:extLst>
-              <a:ext uri="{91240B29-F687-4f45-9708-019B960494DF}">
-                <a14:hiddenLine xmlns="" xmlns:a14="http://schemas.microsoft.com/office/drawing/2010/main" w="9525">
+              <a:ext uri="{91240B29-F687-4F45-9708-019B960494DF}">
+                <a14:hiddenLine xmlns:a14="http://schemas.microsoft.com/office/drawing/2010/main" w="9525">
                   <a:solidFill>
                     <a:srgbClr val="000000"/>
                   </a:solidFill>
@@ -4790,8 +4791,8 @@
               <a:noFill/>
             </a:ln>
             <a:extLst>
-              <a:ext uri="{91240B29-F687-4f45-9708-019B960494DF}">
-                <a14:hiddenLine xmlns="" xmlns:a14="http://schemas.microsoft.com/office/drawing/2010/main" w="9525">
+              <a:ext uri="{91240B29-F687-4F45-9708-019B960494DF}">
+                <a14:hiddenLine xmlns:a14="http://schemas.microsoft.com/office/drawing/2010/main" w="9525">
                   <a:solidFill>
                     <a:srgbClr val="000000"/>
                   </a:solidFill>
@@ -4852,8 +4853,8 @@
               <a:noFill/>
             </a:ln>
             <a:extLst>
-              <a:ext uri="{91240B29-F687-4f45-9708-019B960494DF}">
-                <a14:hiddenLine xmlns="" xmlns:a14="http://schemas.microsoft.com/office/drawing/2010/main" w="9525">
+              <a:ext uri="{91240B29-F687-4F45-9708-019B960494DF}">
+                <a14:hiddenLine xmlns:a14="http://schemas.microsoft.com/office/drawing/2010/main" w="9525">
                   <a:solidFill>
                     <a:srgbClr val="000000"/>
                   </a:solidFill>
@@ -4962,8 +4963,8 @@
               <a:noFill/>
             </a:ln>
             <a:extLst>
-              <a:ext uri="{91240B29-F687-4f45-9708-019B960494DF}">
-                <a14:hiddenLine xmlns="" xmlns:a14="http://schemas.microsoft.com/office/drawing/2010/main" w="9525">
+              <a:ext uri="{91240B29-F687-4F45-9708-019B960494DF}">
+                <a14:hiddenLine xmlns:a14="http://schemas.microsoft.com/office/drawing/2010/main" w="9525">
                   <a:solidFill>
                     <a:srgbClr val="000000"/>
                   </a:solidFill>
@@ -5024,8 +5025,8 @@
               <a:noFill/>
             </a:ln>
             <a:extLst>
-              <a:ext uri="{91240B29-F687-4f45-9708-019B960494DF}">
-                <a14:hiddenLine xmlns="" xmlns:a14="http://schemas.microsoft.com/office/drawing/2010/main" w="9525">
+              <a:ext uri="{91240B29-F687-4F45-9708-019B960494DF}">
+                <a14:hiddenLine xmlns:a14="http://schemas.microsoft.com/office/drawing/2010/main" w="9525">
                   <a:solidFill>
                     <a:srgbClr val="000000"/>
                   </a:solidFill>
@@ -5114,8 +5115,8 @@
               <a:noFill/>
             </a:ln>
             <a:extLst>
-              <a:ext uri="{91240B29-F687-4f45-9708-019B960494DF}">
-                <a14:hiddenLine xmlns="" xmlns:a14="http://schemas.microsoft.com/office/drawing/2010/main" w="9525">
+              <a:ext uri="{91240B29-F687-4F45-9708-019B960494DF}">
+                <a14:hiddenLine xmlns:a14="http://schemas.microsoft.com/office/drawing/2010/main" w="9525">
                   <a:solidFill>
                     <a:srgbClr val="000000"/>
                   </a:solidFill>
@@ -5204,8 +5205,8 @@
               <a:noFill/>
             </a:ln>
             <a:extLst>
-              <a:ext uri="{91240B29-F687-4f45-9708-019B960494DF}">
-                <a14:hiddenLine xmlns="" xmlns:a14="http://schemas.microsoft.com/office/drawing/2010/main" w="9525">
+              <a:ext uri="{91240B29-F687-4F45-9708-019B960494DF}">
+                <a14:hiddenLine xmlns:a14="http://schemas.microsoft.com/office/drawing/2010/main" w="9525">
                   <a:solidFill>
                     <a:srgbClr val="000000"/>
                   </a:solidFill>
@@ -5266,8 +5267,8 @@
               <a:noFill/>
             </a:ln>
             <a:extLst>
-              <a:ext uri="{91240B29-F687-4f45-9708-019B960494DF}">
-                <a14:hiddenLine xmlns="" xmlns:a14="http://schemas.microsoft.com/office/drawing/2010/main" w="9525">
+              <a:ext uri="{91240B29-F687-4F45-9708-019B960494DF}">
+                <a14:hiddenLine xmlns:a14="http://schemas.microsoft.com/office/drawing/2010/main" w="9525">
                   <a:solidFill>
                     <a:srgbClr val="000000"/>
                   </a:solidFill>
@@ -5356,8 +5357,8 @@
               <a:noFill/>
             </a:ln>
             <a:extLst>
-              <a:ext uri="{91240B29-F687-4f45-9708-019B960494DF}">
-                <a14:hiddenLine xmlns="" xmlns:a14="http://schemas.microsoft.com/office/drawing/2010/main" w="9525">
+              <a:ext uri="{91240B29-F687-4F45-9708-019B960494DF}">
+                <a14:hiddenLine xmlns:a14="http://schemas.microsoft.com/office/drawing/2010/main" w="9525">
                   <a:solidFill>
                     <a:srgbClr val="000000"/>
                   </a:solidFill>
@@ -5446,8 +5447,8 @@
               <a:noFill/>
             </a:ln>
             <a:extLst>
-              <a:ext uri="{91240B29-F687-4f45-9708-019B960494DF}">
-                <a14:hiddenLine xmlns="" xmlns:a14="http://schemas.microsoft.com/office/drawing/2010/main" w="9525">
+              <a:ext uri="{91240B29-F687-4F45-9708-019B960494DF}">
+                <a14:hiddenLine xmlns:a14="http://schemas.microsoft.com/office/drawing/2010/main" w="9525">
                   <a:solidFill>
                     <a:srgbClr val="000000"/>
                   </a:solidFill>
@@ -5502,8 +5503,8 @@
               <a:noFill/>
             </a:ln>
             <a:extLst>
-              <a:ext uri="{91240B29-F687-4f45-9708-019B960494DF}">
-                <a14:hiddenLine xmlns="" xmlns:a14="http://schemas.microsoft.com/office/drawing/2010/main" w="9525">
+              <a:ext uri="{91240B29-F687-4F45-9708-019B960494DF}">
+                <a14:hiddenLine xmlns:a14="http://schemas.microsoft.com/office/drawing/2010/main" w="9525">
                   <a:solidFill>
                     <a:srgbClr val="000000"/>
                   </a:solidFill>
@@ -5592,8 +5593,8 @@
               <a:noFill/>
             </a:ln>
             <a:extLst>
-              <a:ext uri="{91240B29-F687-4f45-9708-019B960494DF}">
-                <a14:hiddenLine xmlns="" xmlns:a14="http://schemas.microsoft.com/office/drawing/2010/main" w="9525">
+              <a:ext uri="{91240B29-F687-4F45-9708-019B960494DF}">
+                <a14:hiddenLine xmlns:a14="http://schemas.microsoft.com/office/drawing/2010/main" w="9525">
                   <a:solidFill>
                     <a:srgbClr val="000000"/>
                   </a:solidFill>
@@ -5648,8 +5649,8 @@
               <a:noFill/>
             </a:ln>
             <a:extLst>
-              <a:ext uri="{91240B29-F687-4f45-9708-019B960494DF}">
-                <a14:hiddenLine xmlns="" xmlns:a14="http://schemas.microsoft.com/office/drawing/2010/main" w="9525">
+              <a:ext uri="{91240B29-F687-4F45-9708-019B960494DF}">
+                <a14:hiddenLine xmlns:a14="http://schemas.microsoft.com/office/drawing/2010/main" w="9525">
                   <a:solidFill>
                     <a:srgbClr val="000000"/>
                   </a:solidFill>
@@ -5738,8 +5739,8 @@
               <a:noFill/>
             </a:ln>
             <a:extLst>
-              <a:ext uri="{91240B29-F687-4f45-9708-019B960494DF}">
-                <a14:hiddenLine xmlns="" xmlns:a14="http://schemas.microsoft.com/office/drawing/2010/main" w="9525">
+              <a:ext uri="{91240B29-F687-4F45-9708-019B960494DF}">
+                <a14:hiddenLine xmlns:a14="http://schemas.microsoft.com/office/drawing/2010/main" w="9525">
                   <a:solidFill>
                     <a:srgbClr val="000000"/>
                   </a:solidFill>
@@ -5806,8 +5807,8 @@
               <a:noFill/>
             </a:ln>
             <a:extLst>
-              <a:ext uri="{91240B29-F687-4f45-9708-019B960494DF}">
-                <a14:hiddenLine xmlns="" xmlns:a14="http://schemas.microsoft.com/office/drawing/2010/main" w="9525">
+              <a:ext uri="{91240B29-F687-4F45-9708-019B960494DF}">
+                <a14:hiddenLine xmlns:a14="http://schemas.microsoft.com/office/drawing/2010/main" w="9525">
                   <a:solidFill>
                     <a:srgbClr val="000000"/>
                   </a:solidFill>
@@ -5896,8 +5897,8 @@
               <a:noFill/>
             </a:ln>
             <a:extLst>
-              <a:ext uri="{91240B29-F687-4f45-9708-019B960494DF}">
-                <a14:hiddenLine xmlns="" xmlns:a14="http://schemas.microsoft.com/office/drawing/2010/main" w="9525">
+              <a:ext uri="{91240B29-F687-4F45-9708-019B960494DF}">
+                <a14:hiddenLine xmlns:a14="http://schemas.microsoft.com/office/drawing/2010/main" w="9525">
                   <a:solidFill>
                     <a:srgbClr val="000000"/>
                   </a:solidFill>
@@ -5964,8 +5965,8 @@
               <a:noFill/>
             </a:ln>
             <a:extLst>
-              <a:ext uri="{91240B29-F687-4f45-9708-019B960494DF}">
-                <a14:hiddenLine xmlns="" xmlns:a14="http://schemas.microsoft.com/office/drawing/2010/main" w="9525">
+              <a:ext uri="{91240B29-F687-4F45-9708-019B960494DF}">
+                <a14:hiddenLine xmlns:a14="http://schemas.microsoft.com/office/drawing/2010/main" w="9525">
                   <a:solidFill>
                     <a:srgbClr val="000000"/>
                   </a:solidFill>
@@ -6054,8 +6055,8 @@
               <a:noFill/>
             </a:ln>
             <a:extLst>
-              <a:ext uri="{91240B29-F687-4f45-9708-019B960494DF}">
-                <a14:hiddenLine xmlns="" xmlns:a14="http://schemas.microsoft.com/office/drawing/2010/main" w="9525">
+              <a:ext uri="{91240B29-F687-4F45-9708-019B960494DF}">
+                <a14:hiddenLine xmlns:a14="http://schemas.microsoft.com/office/drawing/2010/main" w="9525">
                   <a:solidFill>
                     <a:srgbClr val="000000"/>
                   </a:solidFill>
@@ -6088,8 +6089,8 @@
               <a:noFill/>
             </a:ln>
             <a:extLst>
-              <a:ext uri="{91240B29-F687-4f45-9708-019B960494DF}">
-                <a14:hiddenLine xmlns="" xmlns:a14="http://schemas.microsoft.com/office/drawing/2010/main" w="9525">
+              <a:ext uri="{91240B29-F687-4F45-9708-019B960494DF}">
+                <a14:hiddenLine xmlns:a14="http://schemas.microsoft.com/office/drawing/2010/main" w="9525">
                   <a:solidFill>
                     <a:srgbClr val="000000"/>
                   </a:solidFill>
@@ -6178,8 +6179,8 @@
               <a:noFill/>
             </a:ln>
             <a:extLst>
-              <a:ext uri="{91240B29-F687-4f45-9708-019B960494DF}">
-                <a14:hiddenLine xmlns="" xmlns:a14="http://schemas.microsoft.com/office/drawing/2010/main" w="9525">
+              <a:ext uri="{91240B29-F687-4F45-9708-019B960494DF}">
+                <a14:hiddenLine xmlns:a14="http://schemas.microsoft.com/office/drawing/2010/main" w="9525">
                   <a:solidFill>
                     <a:srgbClr val="000000"/>
                   </a:solidFill>
@@ -6240,8 +6241,8 @@
               <a:noFill/>
             </a:ln>
             <a:extLst>
-              <a:ext uri="{91240B29-F687-4f45-9708-019B960494DF}">
-                <a14:hiddenLine xmlns="" xmlns:a14="http://schemas.microsoft.com/office/drawing/2010/main" w="9525">
+              <a:ext uri="{91240B29-F687-4F45-9708-019B960494DF}">
+                <a14:hiddenLine xmlns:a14="http://schemas.microsoft.com/office/drawing/2010/main" w="9525">
                   <a:solidFill>
                     <a:srgbClr val="000000"/>
                   </a:solidFill>
@@ -6302,8 +6303,8 @@
               <a:noFill/>
             </a:ln>
             <a:extLst>
-              <a:ext uri="{91240B29-F687-4f45-9708-019B960494DF}">
-                <a14:hiddenLine xmlns="" xmlns:a14="http://schemas.microsoft.com/office/drawing/2010/main" w="9525">
+              <a:ext uri="{91240B29-F687-4F45-9708-019B960494DF}">
+                <a14:hiddenLine xmlns:a14="http://schemas.microsoft.com/office/drawing/2010/main" w="9525">
                   <a:solidFill>
                     <a:srgbClr val="000000"/>
                   </a:solidFill>
@@ -6392,8 +6393,8 @@
               <a:noFill/>
             </a:ln>
             <a:extLst>
-              <a:ext uri="{91240B29-F687-4f45-9708-019B960494DF}">
-                <a14:hiddenLine xmlns="" xmlns:a14="http://schemas.microsoft.com/office/drawing/2010/main" w="9525">
+              <a:ext uri="{91240B29-F687-4F45-9708-019B960494DF}">
+                <a14:hiddenLine xmlns:a14="http://schemas.microsoft.com/office/drawing/2010/main" w="9525">
                   <a:solidFill>
                     <a:srgbClr val="000000"/>
                   </a:solidFill>
@@ -6460,8 +6461,8 @@
               <a:noFill/>
             </a:ln>
             <a:extLst>
-              <a:ext uri="{91240B29-F687-4f45-9708-019B960494DF}">
-                <a14:hiddenLine xmlns="" xmlns:a14="http://schemas.microsoft.com/office/drawing/2010/main" w="9525">
+              <a:ext uri="{91240B29-F687-4F45-9708-019B960494DF}">
+                <a14:hiddenLine xmlns:a14="http://schemas.microsoft.com/office/drawing/2010/main" w="9525">
                   <a:solidFill>
                     <a:srgbClr val="000000"/>
                   </a:solidFill>
@@ -6522,8 +6523,8 @@
               <a:noFill/>
             </a:ln>
             <a:extLst>
-              <a:ext uri="{91240B29-F687-4f45-9708-019B960494DF}">
-                <a14:hiddenLine xmlns="" xmlns:a14="http://schemas.microsoft.com/office/drawing/2010/main" w="9525">
+              <a:ext uri="{91240B29-F687-4F45-9708-019B960494DF}">
+                <a14:hiddenLine xmlns:a14="http://schemas.microsoft.com/office/drawing/2010/main" w="9525">
                   <a:solidFill>
                     <a:srgbClr val="000000"/>
                   </a:solidFill>
@@ -6612,8 +6613,8 @@
               <a:noFill/>
             </a:ln>
             <a:extLst>
-              <a:ext uri="{91240B29-F687-4f45-9708-019B960494DF}">
-                <a14:hiddenLine xmlns="" xmlns:a14="http://schemas.microsoft.com/office/drawing/2010/main" w="9525">
+              <a:ext uri="{91240B29-F687-4F45-9708-019B960494DF}">
+                <a14:hiddenLine xmlns:a14="http://schemas.microsoft.com/office/drawing/2010/main" w="9525">
                   <a:solidFill>
                     <a:srgbClr val="000000"/>
                   </a:solidFill>
@@ -6674,8 +6675,8 @@
               <a:noFill/>
             </a:ln>
             <a:extLst>
-              <a:ext uri="{91240B29-F687-4f45-9708-019B960494DF}">
-                <a14:hiddenLine xmlns="" xmlns:a14="http://schemas.microsoft.com/office/drawing/2010/main" w="9525">
+              <a:ext uri="{91240B29-F687-4F45-9708-019B960494DF}">
+                <a14:hiddenLine xmlns:a14="http://schemas.microsoft.com/office/drawing/2010/main" w="9525">
                   <a:solidFill>
                     <a:srgbClr val="000000"/>
                   </a:solidFill>
@@ -6764,8 +6765,8 @@
               <a:noFill/>
             </a:ln>
             <a:extLst>
-              <a:ext uri="{91240B29-F687-4f45-9708-019B960494DF}">
-                <a14:hiddenLine xmlns="" xmlns:a14="http://schemas.microsoft.com/office/drawing/2010/main" w="9525">
+              <a:ext uri="{91240B29-F687-4F45-9708-019B960494DF}">
+                <a14:hiddenLine xmlns:a14="http://schemas.microsoft.com/office/drawing/2010/main" w="9525">
                   <a:solidFill>
                     <a:srgbClr val="000000"/>
                   </a:solidFill>
@@ -6826,8 +6827,8 @@
               <a:noFill/>
             </a:ln>
             <a:extLst>
-              <a:ext uri="{91240B29-F687-4f45-9708-019B960494DF}">
-                <a14:hiddenLine xmlns="" xmlns:a14="http://schemas.microsoft.com/office/drawing/2010/main" w="9525">
+              <a:ext uri="{91240B29-F687-4F45-9708-019B960494DF}">
+                <a14:hiddenLine xmlns:a14="http://schemas.microsoft.com/office/drawing/2010/main" w="9525">
                   <a:solidFill>
                     <a:srgbClr val="000000"/>
                   </a:solidFill>
@@ -6916,8 +6917,8 @@
               <a:noFill/>
             </a:ln>
             <a:extLst>
-              <a:ext uri="{91240B29-F687-4f45-9708-019B960494DF}">
-                <a14:hiddenLine xmlns="" xmlns:a14="http://schemas.microsoft.com/office/drawing/2010/main" w="9525">
+              <a:ext uri="{91240B29-F687-4F45-9708-019B960494DF}">
+                <a14:hiddenLine xmlns:a14="http://schemas.microsoft.com/office/drawing/2010/main" w="9525">
                   <a:solidFill>
                     <a:srgbClr val="000000"/>
                   </a:solidFill>
@@ -6950,8 +6951,8 @@
               <a:noFill/>
             </a:ln>
             <a:extLst>
-              <a:ext uri="{91240B29-F687-4f45-9708-019B960494DF}">
-                <a14:hiddenLine xmlns="" xmlns:a14="http://schemas.microsoft.com/office/drawing/2010/main" w="9525">
+              <a:ext uri="{91240B29-F687-4F45-9708-019B960494DF}">
+                <a14:hiddenLine xmlns:a14="http://schemas.microsoft.com/office/drawing/2010/main" w="9525">
                   <a:solidFill>
                     <a:srgbClr val="000000"/>
                   </a:solidFill>
@@ -7015,8 +7016,8 @@
               <a:noFill/>
             </a:ln>
             <a:extLst>
-              <a:ext uri="{91240B29-F687-4f45-9708-019B960494DF}">
-                <a14:hiddenLine xmlns="" xmlns:a14="http://schemas.microsoft.com/office/drawing/2010/main" w="9525">
+              <a:ext uri="{91240B29-F687-4F45-9708-019B960494DF}">
+                <a14:hiddenLine xmlns:a14="http://schemas.microsoft.com/office/drawing/2010/main" w="9525">
                   <a:solidFill>
                     <a:srgbClr val="000000"/>
                   </a:solidFill>
@@ -7105,8 +7106,8 @@
               <a:noFill/>
             </a:ln>
             <a:extLst>
-              <a:ext uri="{91240B29-F687-4f45-9708-019B960494DF}">
-                <a14:hiddenLine xmlns="" xmlns:a14="http://schemas.microsoft.com/office/drawing/2010/main" w="9525">
+              <a:ext uri="{91240B29-F687-4F45-9708-019B960494DF}">
+                <a14:hiddenLine xmlns:a14="http://schemas.microsoft.com/office/drawing/2010/main" w="9525">
                   <a:solidFill>
                     <a:srgbClr val="000000"/>
                   </a:solidFill>
@@ -7167,8 +7168,8 @@
               <a:noFill/>
             </a:ln>
             <a:extLst>
-              <a:ext uri="{91240B29-F687-4f45-9708-019B960494DF}">
-                <a14:hiddenLine xmlns="" xmlns:a14="http://schemas.microsoft.com/office/drawing/2010/main" w="9525">
+              <a:ext uri="{91240B29-F687-4F45-9708-019B960494DF}">
+                <a14:hiddenLine xmlns:a14="http://schemas.microsoft.com/office/drawing/2010/main" w="9525">
                   <a:solidFill>
                     <a:srgbClr val="000000"/>
                   </a:solidFill>
@@ -7257,8 +7258,8 @@
               <a:noFill/>
             </a:ln>
             <a:extLst>
-              <a:ext uri="{91240B29-F687-4f45-9708-019B960494DF}">
-                <a14:hiddenLine xmlns="" xmlns:a14="http://schemas.microsoft.com/office/drawing/2010/main" w="9525">
+              <a:ext uri="{91240B29-F687-4F45-9708-019B960494DF}">
+                <a14:hiddenLine xmlns:a14="http://schemas.microsoft.com/office/drawing/2010/main" w="9525">
                   <a:solidFill>
                     <a:srgbClr val="000000"/>
                   </a:solidFill>
@@ -7347,8 +7348,8 @@
               <a:noFill/>
             </a:ln>
             <a:extLst>
-              <a:ext uri="{91240B29-F687-4f45-9708-019B960494DF}">
-                <a14:hiddenLine xmlns="" xmlns:a14="http://schemas.microsoft.com/office/drawing/2010/main" w="9525">
+              <a:ext uri="{91240B29-F687-4F45-9708-019B960494DF}">
+                <a14:hiddenLine xmlns:a14="http://schemas.microsoft.com/office/drawing/2010/main" w="9525">
                   <a:solidFill>
                     <a:srgbClr val="000000"/>
                   </a:solidFill>
@@ -7412,8 +7413,8 @@
               <a:noFill/>
             </a:ln>
             <a:extLst>
-              <a:ext uri="{91240B29-F687-4f45-9708-019B960494DF}">
-                <a14:hiddenLine xmlns="" xmlns:a14="http://schemas.microsoft.com/office/drawing/2010/main" w="9525">
+              <a:ext uri="{91240B29-F687-4F45-9708-019B960494DF}">
+                <a14:hiddenLine xmlns:a14="http://schemas.microsoft.com/office/drawing/2010/main" w="9525">
                   <a:solidFill>
                     <a:srgbClr val="000000"/>
                   </a:solidFill>
@@ -7474,8 +7475,8 @@
               <a:noFill/>
             </a:ln>
             <a:extLst>
-              <a:ext uri="{91240B29-F687-4f45-9708-019B960494DF}">
-                <a14:hiddenLine xmlns="" xmlns:a14="http://schemas.microsoft.com/office/drawing/2010/main" w="9525">
+              <a:ext uri="{91240B29-F687-4F45-9708-019B960494DF}">
+                <a14:hiddenLine xmlns:a14="http://schemas.microsoft.com/office/drawing/2010/main" w="9525">
                   <a:solidFill>
                     <a:srgbClr val="000000"/>
                   </a:solidFill>
@@ -7564,8 +7565,8 @@
               <a:noFill/>
             </a:ln>
             <a:extLst>
-              <a:ext uri="{91240B29-F687-4f45-9708-019B960494DF}">
-                <a14:hiddenLine xmlns="" xmlns:a14="http://schemas.microsoft.com/office/drawing/2010/main" w="9525">
+              <a:ext uri="{91240B29-F687-4F45-9708-019B960494DF}">
+                <a14:hiddenLine xmlns:a14="http://schemas.microsoft.com/office/drawing/2010/main" w="9525">
                   <a:solidFill>
                     <a:srgbClr val="000000"/>
                   </a:solidFill>
@@ -7654,8 +7655,8 @@
               <a:noFill/>
             </a:ln>
             <a:extLst>
-              <a:ext uri="{91240B29-F687-4f45-9708-019B960494DF}">
-                <a14:hiddenLine xmlns="" xmlns:a14="http://schemas.microsoft.com/office/drawing/2010/main" w="9525">
+              <a:ext uri="{91240B29-F687-4F45-9708-019B960494DF}">
+                <a14:hiddenLine xmlns:a14="http://schemas.microsoft.com/office/drawing/2010/main" w="9525">
                   <a:solidFill>
                     <a:srgbClr val="000000"/>
                   </a:solidFill>
@@ -7716,8 +7717,8 @@
               <a:noFill/>
             </a:ln>
             <a:extLst>
-              <a:ext uri="{91240B29-F687-4f45-9708-019B960494DF}">
-                <a14:hiddenLine xmlns="" xmlns:a14="http://schemas.microsoft.com/office/drawing/2010/main" w="9525">
+              <a:ext uri="{91240B29-F687-4F45-9708-019B960494DF}">
+                <a14:hiddenLine xmlns:a14="http://schemas.microsoft.com/office/drawing/2010/main" w="9525">
                   <a:solidFill>
                     <a:srgbClr val="000000"/>
                   </a:solidFill>
@@ -7836,8 +7837,8 @@
               <a:noFill/>
             </a:ln>
             <a:extLst>
-              <a:ext uri="{91240B29-F687-4f45-9708-019B960494DF}">
-                <a14:hiddenLine xmlns="" xmlns:a14="http://schemas.microsoft.com/office/drawing/2010/main" w="9525">
+              <a:ext uri="{91240B29-F687-4F45-9708-019B960494DF}">
+                <a14:hiddenLine xmlns:a14="http://schemas.microsoft.com/office/drawing/2010/main" w="9525">
                   <a:solidFill>
                     <a:srgbClr val="000000"/>
                   </a:solidFill>
@@ -7904,8 +7905,8 @@
               <a:noFill/>
             </a:ln>
             <a:extLst>
-              <a:ext uri="{91240B29-F687-4f45-9708-019B960494DF}">
-                <a14:hiddenLine xmlns="" xmlns:a14="http://schemas.microsoft.com/office/drawing/2010/main" w="9525">
+              <a:ext uri="{91240B29-F687-4F45-9708-019B960494DF}">
+                <a14:hiddenLine xmlns:a14="http://schemas.microsoft.com/office/drawing/2010/main" w="9525">
                   <a:solidFill>
                     <a:srgbClr val="000000"/>
                   </a:solidFill>
@@ -7994,8 +7995,8 @@
               <a:noFill/>
             </a:ln>
             <a:extLst>
-              <a:ext uri="{91240B29-F687-4f45-9708-019B960494DF}">
-                <a14:hiddenLine xmlns="" xmlns:a14="http://schemas.microsoft.com/office/drawing/2010/main" w="9525">
+              <a:ext uri="{91240B29-F687-4F45-9708-019B960494DF}">
+                <a14:hiddenLine xmlns:a14="http://schemas.microsoft.com/office/drawing/2010/main" w="9525">
                   <a:solidFill>
                     <a:srgbClr val="000000"/>
                   </a:solidFill>
@@ -13013,8 +13014,8 @@
           </a:prstGeom>
           <a:noFill/>
           <a:extLst>
-            <a:ext uri="{909E8E84-426E-40dd-AFC4-6F175D3DCCD1}">
-              <a14:hiddenFill xmlns="" xmlns:a14="http://schemas.microsoft.com/office/drawing/2010/main">
+            <a:ext uri="{909E8E84-426E-40DD-AFC4-6F175D3DCCD1}">
+              <a14:hiddenFill xmlns:a14="http://schemas.microsoft.com/office/drawing/2010/main">
                 <a:solidFill>
                   <a:srgbClr val="FFFFFF"/>
                 </a:solidFill>
@@ -13087,8 +13088,8 @@
                 <a:noFill/>
               </a:ln>
               <a:extLst>
-                <a:ext uri="{91240B29-F687-4f45-9708-019B960494DF}">
-                  <a14:hiddenLine xmlns="" xmlns:a14="http://schemas.microsoft.com/office/drawing/2010/main" w="9525">
+                <a:ext uri="{91240B29-F687-4F45-9708-019B960494DF}">
+                  <a14:hiddenLine xmlns:a14="http://schemas.microsoft.com/office/drawing/2010/main" w="9525">
                     <a:solidFill>
                       <a:srgbClr val="000000"/>
                     </a:solidFill>
@@ -13177,8 +13178,8 @@
                 <a:noFill/>
               </a:ln>
               <a:extLst>
-                <a:ext uri="{91240B29-F687-4f45-9708-019B960494DF}">
-                  <a14:hiddenLine xmlns="" xmlns:a14="http://schemas.microsoft.com/office/drawing/2010/main" w="9525">
+                <a:ext uri="{91240B29-F687-4F45-9708-019B960494DF}">
+                  <a14:hiddenLine xmlns:a14="http://schemas.microsoft.com/office/drawing/2010/main" w="9525">
                     <a:solidFill>
                       <a:srgbClr val="000000"/>
                     </a:solidFill>
@@ -13267,8 +13268,8 @@
                 <a:noFill/>
               </a:ln>
               <a:extLst>
-                <a:ext uri="{91240B29-F687-4f45-9708-019B960494DF}">
-                  <a14:hiddenLine xmlns="" xmlns:a14="http://schemas.microsoft.com/office/drawing/2010/main" w="9525">
+                <a:ext uri="{91240B29-F687-4F45-9708-019B960494DF}">
+                  <a14:hiddenLine xmlns:a14="http://schemas.microsoft.com/office/drawing/2010/main" w="9525">
                     <a:solidFill>
                       <a:srgbClr val="000000"/>
                     </a:solidFill>
@@ -13329,8 +13330,8 @@
                 <a:noFill/>
               </a:ln>
               <a:extLst>
-                <a:ext uri="{91240B29-F687-4f45-9708-019B960494DF}">
-                  <a14:hiddenLine xmlns="" xmlns:a14="http://schemas.microsoft.com/office/drawing/2010/main" w="9525">
+                <a:ext uri="{91240B29-F687-4F45-9708-019B960494DF}">
+                  <a14:hiddenLine xmlns:a14="http://schemas.microsoft.com/office/drawing/2010/main" w="9525">
                     <a:solidFill>
                       <a:srgbClr val="000000"/>
                     </a:solidFill>
@@ -13419,8 +13420,8 @@
                 <a:noFill/>
               </a:ln>
               <a:extLst>
-                <a:ext uri="{91240B29-F687-4f45-9708-019B960494DF}">
-                  <a14:hiddenLine xmlns="" xmlns:a14="http://schemas.microsoft.com/office/drawing/2010/main" w="9525">
+                <a:ext uri="{91240B29-F687-4F45-9708-019B960494DF}">
+                  <a14:hiddenLine xmlns:a14="http://schemas.microsoft.com/office/drawing/2010/main" w="9525">
                     <a:solidFill>
                       <a:srgbClr val="000000"/>
                     </a:solidFill>
@@ -13481,8 +13482,8 @@
                 <a:noFill/>
               </a:ln>
               <a:extLst>
-                <a:ext uri="{91240B29-F687-4f45-9708-019B960494DF}">
-                  <a14:hiddenLine xmlns="" xmlns:a14="http://schemas.microsoft.com/office/drawing/2010/main" w="9525">
+                <a:ext uri="{91240B29-F687-4F45-9708-019B960494DF}">
+                  <a14:hiddenLine xmlns:a14="http://schemas.microsoft.com/office/drawing/2010/main" w="9525">
                     <a:solidFill>
                       <a:srgbClr val="000000"/>
                     </a:solidFill>
@@ -13543,8 +13544,8 @@
                 <a:noFill/>
               </a:ln>
               <a:extLst>
-                <a:ext uri="{91240B29-F687-4f45-9708-019B960494DF}">
-                  <a14:hiddenLine xmlns="" xmlns:a14="http://schemas.microsoft.com/office/drawing/2010/main" w="9525">
+                <a:ext uri="{91240B29-F687-4F45-9708-019B960494DF}">
+                  <a14:hiddenLine xmlns:a14="http://schemas.microsoft.com/office/drawing/2010/main" w="9525">
                     <a:solidFill>
                       <a:srgbClr val="000000"/>
                     </a:solidFill>
@@ -13633,8 +13634,8 @@
                 <a:noFill/>
               </a:ln>
               <a:extLst>
-                <a:ext uri="{91240B29-F687-4f45-9708-019B960494DF}">
-                  <a14:hiddenLine xmlns="" xmlns:a14="http://schemas.microsoft.com/office/drawing/2010/main" w="9525">
+                <a:ext uri="{91240B29-F687-4F45-9708-019B960494DF}">
+                  <a14:hiddenLine xmlns:a14="http://schemas.microsoft.com/office/drawing/2010/main" w="9525">
                     <a:solidFill>
                       <a:srgbClr val="000000"/>
                     </a:solidFill>
@@ -13723,8 +13724,8 @@
                 <a:noFill/>
               </a:ln>
               <a:extLst>
-                <a:ext uri="{91240B29-F687-4f45-9708-019B960494DF}">
-                  <a14:hiddenLine xmlns="" xmlns:a14="http://schemas.microsoft.com/office/drawing/2010/main" w="9525">
+                <a:ext uri="{91240B29-F687-4F45-9708-019B960494DF}">
+                  <a14:hiddenLine xmlns:a14="http://schemas.microsoft.com/office/drawing/2010/main" w="9525">
                     <a:solidFill>
                       <a:srgbClr val="000000"/>
                     </a:solidFill>
@@ -13785,8 +13786,8 @@
                 <a:noFill/>
               </a:ln>
               <a:extLst>
-                <a:ext uri="{91240B29-F687-4f45-9708-019B960494DF}">
-                  <a14:hiddenLine xmlns="" xmlns:a14="http://schemas.microsoft.com/office/drawing/2010/main" w="9525">
+                <a:ext uri="{91240B29-F687-4F45-9708-019B960494DF}">
+                  <a14:hiddenLine xmlns:a14="http://schemas.microsoft.com/office/drawing/2010/main" w="9525">
                     <a:solidFill>
                       <a:srgbClr val="000000"/>
                     </a:solidFill>
@@ -13895,8 +13896,8 @@
                 <a:noFill/>
               </a:ln>
               <a:extLst>
-                <a:ext uri="{91240B29-F687-4f45-9708-019B960494DF}">
-                  <a14:hiddenLine xmlns="" xmlns:a14="http://schemas.microsoft.com/office/drawing/2010/main" w="9525">
+                <a:ext uri="{91240B29-F687-4F45-9708-019B960494DF}">
+                  <a14:hiddenLine xmlns:a14="http://schemas.microsoft.com/office/drawing/2010/main" w="9525">
                     <a:solidFill>
                       <a:srgbClr val="000000"/>
                     </a:solidFill>
@@ -13979,8 +13980,8 @@
                 <a:noFill/>
               </a:ln>
               <a:extLst>
-                <a:ext uri="{91240B29-F687-4f45-9708-019B960494DF}">
-                  <a14:hiddenLine xmlns="" xmlns:a14="http://schemas.microsoft.com/office/drawing/2010/main" w="9525">
+                <a:ext uri="{91240B29-F687-4F45-9708-019B960494DF}">
+                  <a14:hiddenLine xmlns:a14="http://schemas.microsoft.com/office/drawing/2010/main" w="9525">
                     <a:solidFill>
                       <a:srgbClr val="000000"/>
                     </a:solidFill>
@@ -14041,8 +14042,8 @@
                 <a:noFill/>
               </a:ln>
               <a:extLst>
-                <a:ext uri="{91240B29-F687-4f45-9708-019B960494DF}">
-                  <a14:hiddenLine xmlns="" xmlns:a14="http://schemas.microsoft.com/office/drawing/2010/main" w="9525">
+                <a:ext uri="{91240B29-F687-4F45-9708-019B960494DF}">
+                  <a14:hiddenLine xmlns:a14="http://schemas.microsoft.com/office/drawing/2010/main" w="9525">
                     <a:solidFill>
                       <a:srgbClr val="000000"/>
                     </a:solidFill>
@@ -14103,8 +14104,8 @@
                 <a:noFill/>
               </a:ln>
               <a:extLst>
-                <a:ext uri="{91240B29-F687-4f45-9708-019B960494DF}">
-                  <a14:hiddenLine xmlns="" xmlns:a14="http://schemas.microsoft.com/office/drawing/2010/main" w="9525">
+                <a:ext uri="{91240B29-F687-4F45-9708-019B960494DF}">
+                  <a14:hiddenLine xmlns:a14="http://schemas.microsoft.com/office/drawing/2010/main" w="9525">
                     <a:solidFill>
                       <a:srgbClr val="000000"/>
                     </a:solidFill>
@@ -14193,8 +14194,8 @@
                 <a:noFill/>
               </a:ln>
               <a:extLst>
-                <a:ext uri="{91240B29-F687-4f45-9708-019B960494DF}">
-                  <a14:hiddenLine xmlns="" xmlns:a14="http://schemas.microsoft.com/office/drawing/2010/main" w="9525">
+                <a:ext uri="{91240B29-F687-4F45-9708-019B960494DF}">
+                  <a14:hiddenLine xmlns:a14="http://schemas.microsoft.com/office/drawing/2010/main" w="9525">
                     <a:solidFill>
                       <a:srgbClr val="000000"/>
                     </a:solidFill>
@@ -14227,8 +14228,8 @@
                 <a:noFill/>
               </a:ln>
               <a:extLst>
-                <a:ext uri="{91240B29-F687-4f45-9708-019B960494DF}">
-                  <a14:hiddenLine xmlns="" xmlns:a14="http://schemas.microsoft.com/office/drawing/2010/main" w="9525">
+                <a:ext uri="{91240B29-F687-4F45-9708-019B960494DF}">
+                  <a14:hiddenLine xmlns:a14="http://schemas.microsoft.com/office/drawing/2010/main" w="9525">
                     <a:solidFill>
                       <a:srgbClr val="000000"/>
                     </a:solidFill>
@@ -14292,8 +14293,8 @@
                 <a:noFill/>
               </a:ln>
               <a:extLst>
-                <a:ext uri="{91240B29-F687-4f45-9708-019B960494DF}">
-                  <a14:hiddenLine xmlns="" xmlns:a14="http://schemas.microsoft.com/office/drawing/2010/main" w="9525">
+                <a:ext uri="{91240B29-F687-4F45-9708-019B960494DF}">
+                  <a14:hiddenLine xmlns:a14="http://schemas.microsoft.com/office/drawing/2010/main" w="9525">
                     <a:solidFill>
                       <a:srgbClr val="000000"/>
                     </a:solidFill>
@@ -14382,8 +14383,8 @@
                 <a:noFill/>
               </a:ln>
               <a:extLst>
-                <a:ext uri="{91240B29-F687-4f45-9708-019B960494DF}">
-                  <a14:hiddenLine xmlns="" xmlns:a14="http://schemas.microsoft.com/office/drawing/2010/main" w="9525">
+                <a:ext uri="{91240B29-F687-4F45-9708-019B960494DF}">
+                  <a14:hiddenLine xmlns:a14="http://schemas.microsoft.com/office/drawing/2010/main" w="9525">
                     <a:solidFill>
                       <a:srgbClr val="000000"/>
                     </a:solidFill>
@@ -14444,8 +14445,8 @@
                 <a:noFill/>
               </a:ln>
               <a:extLst>
-                <a:ext uri="{91240B29-F687-4f45-9708-019B960494DF}">
-                  <a14:hiddenLine xmlns="" xmlns:a14="http://schemas.microsoft.com/office/drawing/2010/main" w="9525">
+                <a:ext uri="{91240B29-F687-4F45-9708-019B960494DF}">
+                  <a14:hiddenLine xmlns:a14="http://schemas.microsoft.com/office/drawing/2010/main" w="9525">
                     <a:solidFill>
                       <a:srgbClr val="000000"/>
                     </a:solidFill>
@@ -14534,8 +14535,8 @@
                 <a:noFill/>
               </a:ln>
               <a:extLst>
-                <a:ext uri="{91240B29-F687-4f45-9708-019B960494DF}">
-                  <a14:hiddenLine xmlns="" xmlns:a14="http://schemas.microsoft.com/office/drawing/2010/main" w="9525">
+                <a:ext uri="{91240B29-F687-4F45-9708-019B960494DF}">
+                  <a14:hiddenLine xmlns:a14="http://schemas.microsoft.com/office/drawing/2010/main" w="9525">
                     <a:solidFill>
                       <a:srgbClr val="000000"/>
                     </a:solidFill>
@@ -14599,8 +14600,8 @@
                 <a:noFill/>
               </a:ln>
               <a:extLst>
-                <a:ext uri="{91240B29-F687-4f45-9708-019B960494DF}">
-                  <a14:hiddenLine xmlns="" xmlns:a14="http://schemas.microsoft.com/office/drawing/2010/main" w="9525">
+                <a:ext uri="{91240B29-F687-4F45-9708-019B960494DF}">
+                  <a14:hiddenLine xmlns:a14="http://schemas.microsoft.com/office/drawing/2010/main" w="9525">
                     <a:solidFill>
                       <a:srgbClr val="000000"/>
                     </a:solidFill>
@@ -14661,8 +14662,8 @@
                 <a:noFill/>
               </a:ln>
               <a:extLst>
-                <a:ext uri="{91240B29-F687-4f45-9708-019B960494DF}">
-                  <a14:hiddenLine xmlns="" xmlns:a14="http://schemas.microsoft.com/office/drawing/2010/main" w="9525">
+                <a:ext uri="{91240B29-F687-4F45-9708-019B960494DF}">
+                  <a14:hiddenLine xmlns:a14="http://schemas.microsoft.com/office/drawing/2010/main" w="9525">
                     <a:solidFill>
                       <a:srgbClr val="000000"/>
                     </a:solidFill>
@@ -14751,8 +14752,8 @@
                 <a:noFill/>
               </a:ln>
               <a:extLst>
-                <a:ext uri="{91240B29-F687-4f45-9708-019B960494DF}">
-                  <a14:hiddenLine xmlns="" xmlns:a14="http://schemas.microsoft.com/office/drawing/2010/main" w="9525">
+                <a:ext uri="{91240B29-F687-4F45-9708-019B960494DF}">
+                  <a14:hiddenLine xmlns:a14="http://schemas.microsoft.com/office/drawing/2010/main" w="9525">
                     <a:solidFill>
                       <a:srgbClr val="000000"/>
                     </a:solidFill>
@@ -14841,8 +14842,8 @@
                 <a:noFill/>
               </a:ln>
               <a:extLst>
-                <a:ext uri="{91240B29-F687-4f45-9708-019B960494DF}">
-                  <a14:hiddenLine xmlns="" xmlns:a14="http://schemas.microsoft.com/office/drawing/2010/main" w="9525">
+                <a:ext uri="{91240B29-F687-4F45-9708-019B960494DF}">
+                  <a14:hiddenLine xmlns:a14="http://schemas.microsoft.com/office/drawing/2010/main" w="9525">
                     <a:solidFill>
                       <a:srgbClr val="000000"/>
                     </a:solidFill>
@@ -14906,8 +14907,8 @@
                 <a:noFill/>
               </a:ln>
               <a:extLst>
-                <a:ext uri="{91240B29-F687-4f45-9708-019B960494DF}">
-                  <a14:hiddenLine xmlns="" xmlns:a14="http://schemas.microsoft.com/office/drawing/2010/main" w="9525">
+                <a:ext uri="{91240B29-F687-4F45-9708-019B960494DF}">
+                  <a14:hiddenLine xmlns:a14="http://schemas.microsoft.com/office/drawing/2010/main" w="9525">
                     <a:solidFill>
                       <a:srgbClr val="000000"/>
                     </a:solidFill>
@@ -15026,8 +15027,8 @@
                 <a:noFill/>
               </a:ln>
               <a:extLst>
-                <a:ext uri="{91240B29-F687-4f45-9708-019B960494DF}">
-                  <a14:hiddenLine xmlns="" xmlns:a14="http://schemas.microsoft.com/office/drawing/2010/main" w="9525">
+                <a:ext uri="{91240B29-F687-4F45-9708-019B960494DF}">
+                  <a14:hiddenLine xmlns:a14="http://schemas.microsoft.com/office/drawing/2010/main" w="9525">
                     <a:solidFill>
                       <a:srgbClr val="000000"/>
                     </a:solidFill>
@@ -15124,8 +15125,8 @@
                 <a:noFill/>
               </a:ln>
               <a:extLst>
-                <a:ext uri="{91240B29-F687-4f45-9708-019B960494DF}">
-                  <a14:hiddenLine xmlns="" xmlns:a14="http://schemas.microsoft.com/office/drawing/2010/main" w="9525">
+                <a:ext uri="{91240B29-F687-4F45-9708-019B960494DF}">
+                  <a14:hiddenLine xmlns:a14="http://schemas.microsoft.com/office/drawing/2010/main" w="9525">
                     <a:solidFill>
                       <a:srgbClr val="000000"/>
                     </a:solidFill>
@@ -15239,8 +15240,8 @@
                 <a:noFill/>
               </a:ln>
               <a:extLst>
-                <a:ext uri="{91240B29-F687-4f45-9708-019B960494DF}">
-                  <a14:hiddenLine xmlns="" xmlns:a14="http://schemas.microsoft.com/office/drawing/2010/main" w="9525">
+                <a:ext uri="{91240B29-F687-4F45-9708-019B960494DF}">
+                  <a14:hiddenLine xmlns:a14="http://schemas.microsoft.com/office/drawing/2010/main" w="9525">
                     <a:solidFill>
                       <a:srgbClr val="000000"/>
                     </a:solidFill>
@@ -15329,8 +15330,8 @@
                 <a:noFill/>
               </a:ln>
               <a:extLst>
-                <a:ext uri="{91240B29-F687-4f45-9708-019B960494DF}">
-                  <a14:hiddenLine xmlns="" xmlns:a14="http://schemas.microsoft.com/office/drawing/2010/main" w="9525">
+                <a:ext uri="{91240B29-F687-4F45-9708-019B960494DF}">
+                  <a14:hiddenLine xmlns:a14="http://schemas.microsoft.com/office/drawing/2010/main" w="9525">
                     <a:solidFill>
                       <a:srgbClr val="000000"/>
                     </a:solidFill>
@@ -15394,8 +15395,8 @@
                 <a:noFill/>
               </a:ln>
               <a:extLst>
-                <a:ext uri="{91240B29-F687-4f45-9708-019B960494DF}">
-                  <a14:hiddenLine xmlns="" xmlns:a14="http://schemas.microsoft.com/office/drawing/2010/main" w="9525">
+                <a:ext uri="{91240B29-F687-4F45-9708-019B960494DF}">
+                  <a14:hiddenLine xmlns:a14="http://schemas.microsoft.com/office/drawing/2010/main" w="9525">
                     <a:solidFill>
                       <a:srgbClr val="000000"/>
                     </a:solidFill>
@@ -15484,8 +15485,8 @@
                 <a:noFill/>
               </a:ln>
               <a:extLst>
-                <a:ext uri="{91240B29-F687-4f45-9708-019B960494DF}">
-                  <a14:hiddenLine xmlns="" xmlns:a14="http://schemas.microsoft.com/office/drawing/2010/main" w="9525">
+                <a:ext uri="{91240B29-F687-4F45-9708-019B960494DF}">
+                  <a14:hiddenLine xmlns:a14="http://schemas.microsoft.com/office/drawing/2010/main" w="9525">
                     <a:solidFill>
                       <a:srgbClr val="000000"/>
                     </a:solidFill>
@@ -15552,8 +15553,8 @@
                 <a:noFill/>
               </a:ln>
               <a:extLst>
-                <a:ext uri="{91240B29-F687-4f45-9708-019B960494DF}">
-                  <a14:hiddenLine xmlns="" xmlns:a14="http://schemas.microsoft.com/office/drawing/2010/main" w="9525">
+                <a:ext uri="{91240B29-F687-4F45-9708-019B960494DF}">
+                  <a14:hiddenLine xmlns:a14="http://schemas.microsoft.com/office/drawing/2010/main" w="9525">
                     <a:solidFill>
                       <a:srgbClr val="000000"/>
                     </a:solidFill>
@@ -15642,8 +15643,8 @@
                 <a:noFill/>
               </a:ln>
               <a:extLst>
-                <a:ext uri="{91240B29-F687-4f45-9708-019B960494DF}">
-                  <a14:hiddenLine xmlns="" xmlns:a14="http://schemas.microsoft.com/office/drawing/2010/main" w="9525">
+                <a:ext uri="{91240B29-F687-4F45-9708-019B960494DF}">
+                  <a14:hiddenLine xmlns:a14="http://schemas.microsoft.com/office/drawing/2010/main" w="9525">
                     <a:solidFill>
                       <a:srgbClr val="000000"/>
                     </a:solidFill>
@@ -15710,8 +15711,8 @@
                 <a:noFill/>
               </a:ln>
               <a:extLst>
-                <a:ext uri="{91240B29-F687-4f45-9708-019B960494DF}">
-                  <a14:hiddenLine xmlns="" xmlns:a14="http://schemas.microsoft.com/office/drawing/2010/main" w="9525">
+                <a:ext uri="{91240B29-F687-4F45-9708-019B960494DF}">
+                  <a14:hiddenLine xmlns:a14="http://schemas.microsoft.com/office/drawing/2010/main" w="9525">
                     <a:solidFill>
                       <a:srgbClr val="000000"/>
                     </a:solidFill>
@@ -15800,8 +15801,8 @@
                 <a:noFill/>
               </a:ln>
               <a:extLst>
-                <a:ext uri="{91240B29-F687-4f45-9708-019B960494DF}">
-                  <a14:hiddenLine xmlns="" xmlns:a14="http://schemas.microsoft.com/office/drawing/2010/main" w="9525">
+                <a:ext uri="{91240B29-F687-4F45-9708-019B960494DF}">
+                  <a14:hiddenLine xmlns:a14="http://schemas.microsoft.com/office/drawing/2010/main" w="9525">
                     <a:solidFill>
                       <a:srgbClr val="000000"/>
                     </a:solidFill>
@@ -15834,8 +15835,8 @@
                 <a:noFill/>
               </a:ln>
               <a:extLst>
-                <a:ext uri="{91240B29-F687-4f45-9708-019B960494DF}">
-                  <a14:hiddenLine xmlns="" xmlns:a14="http://schemas.microsoft.com/office/drawing/2010/main" w="9525">
+                <a:ext uri="{91240B29-F687-4F45-9708-019B960494DF}">
+                  <a14:hiddenLine xmlns:a14="http://schemas.microsoft.com/office/drawing/2010/main" w="9525">
                     <a:solidFill>
                       <a:srgbClr val="000000"/>
                     </a:solidFill>
@@ -16594,14 +16595,41 @@
             <p:ph type="title"/>
           </p:nvPr>
         </p:nvSpPr>
-        <p:spPr/>
+        <p:spPr>
+          <a:xfrm>
+            <a:off x="872388" y="765475"/>
+            <a:ext cx="7429499" cy="825818"/>
+          </a:xfrm>
+        </p:spPr>
         <p:txBody>
-          <a:bodyPr/>
+          <a:bodyPr>
+            <a:normAutofit fontScale="90000"/>
+          </a:bodyPr>
           <a:lstStyle/>
           <a:p>
+            <a:pPr algn="ctr"/>
+            <a:r>
+              <a:rPr lang="en-GB" dirty="0" smtClean="0"/>
+              <a:t>Utworzone </a:t>
+            </a:r>
             <a:r>
               <a:rPr lang="pl-PL" dirty="0" smtClean="0"/>
               <a:t>ramki</a:t>
+            </a:r>
+            <a:r>
+              <a:rPr lang="en-GB" dirty="0" smtClean="0"/>
+              <a:t> w kolejności</a:t>
+            </a:r>
+            <a:r>
+              <a:rPr lang="en-GB" dirty="0"/>
+              <a:t/>
+            </a:r>
+            <a:br>
+              <a:rPr lang="en-GB" dirty="0"/>
+            </a:br>
+            <a:r>
+              <a:rPr lang="en-GB" dirty="0" smtClean="0"/>
+              <a:t>priorytetu</a:t>
             </a:r>
             <a:endParaRPr lang="pl-PL" dirty="0"/>
           </a:p>
@@ -16617,27 +16645,40 @@
             <p:ph idx="1"/>
           </p:nvPr>
         </p:nvSpPr>
-        <p:spPr/>
+        <p:spPr>
+          <a:xfrm>
+            <a:off x="856060" y="1750724"/>
+            <a:ext cx="7429499" cy="3541714"/>
+          </a:xfrm>
+        </p:spPr>
         <p:txBody>
-          <a:bodyPr/>
+          <a:bodyPr>
+            <a:normAutofit/>
+          </a:bodyPr>
           <a:lstStyle/>
           <a:p>
-            <a:pPr marL="0" indent="0">
-              <a:buNone/>
-            </a:pPr>
             <a:r>
-              <a:rPr lang="pl-PL" dirty="0" smtClean="0"/>
-              <a:t>/* Jakaś fotka ramki czy coś aby opowiedzieć jak realizujemy </a:t>
+              <a:rPr lang="en-GB" sz="4000" dirty="0" smtClean="0"/>
+              <a:t>CONTROL</a:t>
             </a:r>
+          </a:p>
+          <a:p>
             <a:r>
-              <a:rPr lang="pl-PL" dirty="0" err="1" smtClean="0"/>
-              <a:t>przesył</a:t>
+              <a:rPr lang="en-GB" sz="4000" dirty="0" smtClean="0"/>
+              <a:t>Time</a:t>
             </a:r>
+          </a:p>
+          <a:p>
             <a:r>
-              <a:rPr lang="pl-PL" dirty="0" smtClean="0"/>
-              <a:t> informacji po CAN */</a:t>
+              <a:rPr lang="en-GB" sz="4000" dirty="0" smtClean="0"/>
+              <a:t>Sensor</a:t>
             </a:r>
-            <a:endParaRPr lang="pl-PL" dirty="0"/>
+          </a:p>
+          <a:p>
+            <a:r>
+              <a:rPr lang="en-GB" sz="4000" dirty="0" smtClean="0"/>
+              <a:t>Display</a:t>
+            </a:r>
           </a:p>
         </p:txBody>
       </p:sp>
@@ -16674,6 +16715,149 @@
 </file>
 
 <file path=ppt/slides/slide11.xml><?xml version="1.0" encoding="utf-8"?>
+<p:sld xmlns:a="http://schemas.openxmlformats.org/drawingml/2006/main" xmlns:r="http://schemas.openxmlformats.org/officeDocument/2006/relationships" xmlns:p="http://schemas.openxmlformats.org/presentationml/2006/main">
+  <p:cSld>
+    <p:spTree>
+      <p:nvGrpSpPr>
+        <p:cNvPr id="1" name=""/>
+        <p:cNvGrpSpPr/>
+        <p:nvPr/>
+      </p:nvGrpSpPr>
+      <p:grpSpPr>
+        <a:xfrm>
+          <a:off x="0" y="0"/>
+          <a:ext cx="0" cy="0"/>
+          <a:chOff x="0" y="0"/>
+          <a:chExt cx="0" cy="0"/>
+        </a:xfrm>
+      </p:grpSpPr>
+      <p:sp>
+        <p:nvSpPr>
+          <p:cNvPr id="2" name="Tytuł 1"/>
+          <p:cNvSpPr>
+            <a:spLocks noGrp="1"/>
+          </p:cNvSpPr>
+          <p:nvPr>
+            <p:ph type="title"/>
+          </p:nvPr>
+        </p:nvSpPr>
+        <p:spPr>
+          <a:xfrm>
+            <a:off x="856060" y="618518"/>
+            <a:ext cx="7429499" cy="555655"/>
+          </a:xfrm>
+        </p:spPr>
+        <p:txBody>
+          <a:bodyPr>
+            <a:normAutofit fontScale="90000"/>
+          </a:bodyPr>
+          <a:lstStyle/>
+          <a:p>
+            <a:r>
+              <a:rPr lang="en-GB" dirty="0" smtClean="0"/>
+              <a:t>Layout </a:t>
+            </a:r>
+            <a:r>
+              <a:rPr lang="en-GB" dirty="0" err="1" smtClean="0"/>
+              <a:t>ramki</a:t>
+            </a:r>
+            <a:r>
+              <a:rPr lang="en-GB" dirty="0" smtClean="0"/>
+              <a:t> sensor</a:t>
+            </a:r>
+            <a:endParaRPr lang="pl-PL" dirty="0"/>
+          </a:p>
+        </p:txBody>
+      </p:sp>
+      <p:pic>
+        <p:nvPicPr>
+          <p:cNvPr id="1026" name="Picture 2"/>
+          <p:cNvPicPr>
+            <a:picLocks noGrp="1" noChangeAspect="1" noChangeArrowheads="1"/>
+          </p:cNvPicPr>
+          <p:nvPr>
+            <p:ph idx="1"/>
+          </p:nvPr>
+        </p:nvPicPr>
+        <p:blipFill>
+          <a:blip r:embed="rId2">
+            <a:extLst>
+              <a:ext uri="{28A0092B-C50C-407E-A947-70E740481C1C}">
+                <a14:useLocalDpi xmlns:a14="http://schemas.microsoft.com/office/drawing/2010/main" val="0"/>
+              </a:ext>
+            </a:extLst>
+          </a:blip>
+          <a:srcRect/>
+          <a:stretch>
+            <a:fillRect/>
+          </a:stretch>
+        </p:blipFill>
+        <p:spPr bwMode="auto">
+          <a:xfrm>
+            <a:off x="997944" y="1231322"/>
+            <a:ext cx="7148112" cy="4914900"/>
+          </a:xfrm>
+          <a:prstGeom prst="rect">
+            <a:avLst/>
+          </a:prstGeom>
+          <a:noFill/>
+          <a:ln>
+            <a:noFill/>
+          </a:ln>
+          <a:extLst>
+            <a:ext uri="{909E8E84-426E-40DD-AFC4-6F175D3DCCD1}">
+              <a14:hiddenFill xmlns:a14="http://schemas.microsoft.com/office/drawing/2010/main">
+                <a:solidFill>
+                  <a:schemeClr val="accent1"/>
+                </a:solidFill>
+              </a14:hiddenFill>
+            </a:ext>
+            <a:ext uri="{91240B29-F687-4F45-9708-019B960494DF}">
+              <a14:hiddenLine xmlns:a14="http://schemas.microsoft.com/office/drawing/2010/main" w="9525">
+                <a:solidFill>
+                  <a:schemeClr val="tx1"/>
+                </a:solidFill>
+                <a:miter lim="800000"/>
+                <a:headEnd/>
+                <a:tailEnd/>
+              </a14:hiddenLine>
+            </a:ext>
+          </a:extLst>
+        </p:spPr>
+      </p:pic>
+    </p:spTree>
+    <p:extLst>
+      <p:ext uri="{BB962C8B-B14F-4D97-AF65-F5344CB8AC3E}">
+        <p14:creationId xmlns:p14="http://schemas.microsoft.com/office/powerpoint/2010/main" val="2588091498"/>
+      </p:ext>
+    </p:extLst>
+  </p:cSld>
+  <p:clrMapOvr>
+    <a:masterClrMapping/>
+  </p:clrMapOvr>
+  <mc:AlternateContent xmlns:mc="http://schemas.openxmlformats.org/markup-compatibility/2006" xmlns:p14="http://schemas.microsoft.com/office/powerpoint/2010/main">
+    <mc:Choice Requires="p14">
+      <p:transition spd="slow" p14:dur="1600">
+        <p14:conveyor dir="l"/>
+      </p:transition>
+    </mc:Choice>
+    <mc:Fallback xmlns="">
+      <p:transition spd="slow">
+        <p:fade/>
+      </p:transition>
+    </mc:Fallback>
+  </mc:AlternateContent>
+  <p:timing>
+    <p:tnLst>
+      <p:par>
+        <p:cTn id="1" dur="indefinite" restart="never" nodeType="tmRoot"/>
+      </p:par>
+    </p:tnLst>
+  </p:timing>
+</p:sld>
+</file>
+
+<file path=ppt/slides/slide12.xml><?xml version="1.0" encoding="utf-8"?>
 <p:sld xmlns:a="http://schemas.openxmlformats.org/drawingml/2006/main" xmlns:r="http://schemas.openxmlformats.org/officeDocument/2006/relationships" xmlns:p="http://schemas.openxmlformats.org/presentationml/2006/main">
   <p:cSld>
     <p:spTree>
@@ -16776,7 +16960,7 @@
 </p:sld>
 </file>
 
-<file path=ppt/slides/slide12.xml><?xml version="1.0" encoding="utf-8"?>
+<file path=ppt/slides/slide13.xml><?xml version="1.0" encoding="utf-8"?>
 <p:sld xmlns:a="http://schemas.openxmlformats.org/drawingml/2006/main" xmlns:r="http://schemas.openxmlformats.org/officeDocument/2006/relationships" xmlns:p="http://schemas.openxmlformats.org/presentationml/2006/main">
   <p:cSld>
     <p:spTree>
@@ -17134,16 +17318,31 @@
         <p:spPr/>
         <p:txBody>
           <a:bodyPr>
-            <a:normAutofit fontScale="92500" lnSpcReduction="10000"/>
+            <a:normAutofit lnSpcReduction="10000"/>
           </a:bodyPr>
           <a:lstStyle/>
           <a:p>
-            <a:pPr marL="0" indent="0">
+            <a:pPr marL="0" indent="0" algn="just">
               <a:buNone/>
             </a:pPr>
             <a:r>
               <a:rPr lang="pl-PL" dirty="0" smtClean="0"/>
-              <a:t>Celem naszego ćwiczenia było wykonanie modelu i symulacji świateł na skrzyżowaniu w programie </a:t>
+              <a:t>Celem naszego ćwiczenia było wykonanie modelu </a:t>
+            </a:r>
+            <a:r>
+              <a:rPr lang="en-GB" dirty="0"/>
+              <a:t/>
+            </a:r>
+            <a:br>
+              <a:rPr lang="en-GB" dirty="0"/>
+            </a:br>
+            <a:r>
+              <a:rPr lang="pl-PL" dirty="0" smtClean="0"/>
+              <a:t>i </a:t>
+            </a:r>
+            <a:r>
+              <a:rPr lang="pl-PL" dirty="0" smtClean="0"/>
+              <a:t>symulacji świateł na skrzyżowaniu w programie </a:t>
             </a:r>
             <a:r>
               <a:rPr lang="pl-PL" dirty="0" err="1" smtClean="0"/>
@@ -17242,7 +17441,7 @@
         <p:spPr/>
         <p:txBody>
           <a:bodyPr>
-            <a:normAutofit fontScale="85000" lnSpcReduction="10000"/>
+            <a:normAutofit fontScale="92500" lnSpcReduction="10000"/>
           </a:bodyPr>
           <a:lstStyle/>
           <a:p>
@@ -17375,32 +17574,19 @@
         <p:spPr/>
         <p:txBody>
           <a:bodyPr>
-            <a:normAutofit fontScale="92500" lnSpcReduction="10000"/>
+            <a:normAutofit lnSpcReduction="10000"/>
           </a:bodyPr>
           <a:lstStyle/>
           <a:p>
             <a:r>
               <a:rPr lang="pl-PL" dirty="0" smtClean="0"/>
-              <a:t>Michał Roman – kierownik zespołu, </a:t>
+              <a:t>Michał Roman – kierownik zespołu, implementacja komunikacji po sieci CAN oraz pracy cyklicznej</a:t>
             </a:r>
-            <a:r>
-              <a:rPr lang="pl-PL" dirty="0" smtClean="0"/>
-              <a:t>implementacja komunikacji po sieci CAN oraz pracy cyklicznej</a:t>
-            </a:r>
-            <a:endParaRPr lang="pl-PL" dirty="0" smtClean="0"/>
           </a:p>
           <a:p>
             <a:r>
               <a:rPr lang="pl-PL" dirty="0" smtClean="0"/>
-              <a:t>Paweł Węgrzyn – </a:t>
-            </a:r>
-            <a:r>
-              <a:rPr lang="pl-PL" dirty="0" smtClean="0"/>
-              <a:t>implementacja algorytmu inteligentnego doboru czasu faz oraz interfejs </a:t>
-            </a:r>
-            <a:r>
-              <a:rPr lang="pl-PL" dirty="0" smtClean="0"/>
-              <a:t>graficzny</a:t>
+              <a:t>Paweł Węgrzyn – implementacja algorytmu inteligentnego doboru czasu faz oraz interfejs graficzny</a:t>
             </a:r>
           </a:p>
           <a:p>
@@ -17420,13 +17606,8 @@
           <a:p>
             <a:r>
               <a:rPr lang="pl-PL" dirty="0" smtClean="0"/>
-              <a:t>Daniel Hyjek, Bartłomiej Styczeń – projekt „inteligencji”, </a:t>
+              <a:t>Daniel Hyjek, Bartłomiej Styczeń – projekt „inteligencji”, przeprowadzenie testów</a:t>
             </a:r>
-            <a:r>
-              <a:rPr lang="pl-PL" dirty="0" smtClean="0"/>
-              <a:t>przeprowadzenie testów</a:t>
-            </a:r>
-            <a:endParaRPr lang="pl-PL" dirty="0" smtClean="0"/>
           </a:p>
           <a:p>
             <a:endParaRPr lang="pl-PL" dirty="0"/>
@@ -23825,7 +24006,7 @@
   <a:extraClrSchemeLst/>
   <a:extLst>
     <a:ext uri="{05A4C25C-085E-4340-85A3-A5531E510DB2}">
-      <thm15:themeFamily xmlns:thm15="http://schemas.microsoft.com/office/thememl/2012/main" name="Circuit" id="{0AC2F7E7-15F5-431C-B2A2-456FE929F56C}" vid="{0911B802-464C-4241-8DD9-B60FF88E379F}"/>
+      <thm15:themeFamily xmlns:thm15="http://schemas.microsoft.com/office/thememl/2012/main" xmlns="" name="Circuit" id="{0AC2F7E7-15F5-431C-B2A2-456FE929F56C}" vid="{0911B802-464C-4241-8DD9-B60FF88E379F}"/>
     </a:ext>
   </a:extLst>
 </a:theme>

</xml_diff>